<commit_message>
some basic scripts, generater made
</commit_message>
<xml_diff>
--- a/Shooting MATH presV1.pptx
+++ b/Shooting MATH presV1.pptx
@@ -7,7 +7,8 @@
   <p:sldIdLst>
     <p:sldId id="256" r:id="rId2"/>
     <p:sldId id="257" r:id="rId3"/>
-    <p:sldId id="258" r:id="rId4"/>
+    <p:sldId id="259" r:id="rId4"/>
+    <p:sldId id="258" r:id="rId5"/>
   </p:sldIdLst>
   <p:sldSz cx="12192000" cy="6858000"/>
   <p:notesSz cx="6858000" cy="9144000"/>
@@ -106,6 +107,11 @@
       </a:defRPr>
     </a:lvl9pPr>
   </p:defaultTextStyle>
+  <p:extLst>
+    <p:ext uri="{EFAFB233-063F-42B5-8137-9DF3F51BA10A}">
+      <p15:sldGuideLst xmlns:p15="http://schemas.microsoft.com/office/powerpoint/2012/main"/>
+    </p:ext>
+  </p:extLst>
 </p:presentation>
 </file>
 
@@ -295,7 +301,7 @@
           <a:p>
             <a:fld id="{4AAD347D-5ACD-4C99-B74B-A9C85AD731AF}" type="datetimeFigureOut">
               <a:rPr lang="en-US" dirty="0"/>
-              <a:t>10/24/2018</a:t>
+              <a:t>10/31/2018</a:t>
             </a:fld>
             <a:endParaRPr lang="en-US" dirty="0"/>
           </a:p>
@@ -565,7 +571,7 @@
           <a:p>
             <a:fld id="{4509A250-FF31-4206-8172-F9D3106AACB1}" type="datetimeFigureOut">
               <a:rPr lang="en-US" dirty="0"/>
-              <a:t>10/24/2018</a:t>
+              <a:t>10/31/2018</a:t>
             </a:fld>
             <a:endParaRPr lang="en-US" dirty="0"/>
           </a:p>
@@ -754,7 +760,7 @@
           <a:p>
             <a:fld id="{4509A250-FF31-4206-8172-F9D3106AACB1}" type="datetimeFigureOut">
               <a:rPr lang="en-US" dirty="0"/>
-              <a:t>10/24/2018</a:t>
+              <a:t>10/31/2018</a:t>
             </a:fld>
             <a:endParaRPr lang="en-US" dirty="0"/>
           </a:p>
@@ -1022,7 +1028,7 @@
           <a:p>
             <a:fld id="{4509A250-FF31-4206-8172-F9D3106AACB1}" type="datetimeFigureOut">
               <a:rPr lang="en-US" dirty="0"/>
-              <a:t>10/24/2018</a:t>
+              <a:t>10/31/2018</a:t>
             </a:fld>
             <a:endParaRPr lang="en-US" dirty="0"/>
           </a:p>
@@ -1358,7 +1364,7 @@
           <a:p>
             <a:fld id="{4509A250-FF31-4206-8172-F9D3106AACB1}" type="datetimeFigureOut">
               <a:rPr lang="en-US" dirty="0"/>
-              <a:t>10/24/2018</a:t>
+              <a:t>10/31/2018</a:t>
             </a:fld>
             <a:endParaRPr lang="en-US" dirty="0"/>
           </a:p>
@@ -1976,7 +1982,7 @@
           <a:p>
             <a:fld id="{4509A250-FF31-4206-8172-F9D3106AACB1}" type="datetimeFigureOut">
               <a:rPr lang="en-US" dirty="0"/>
-              <a:t>10/24/2018</a:t>
+              <a:t>10/31/2018</a:t>
             </a:fld>
             <a:endParaRPr lang="en-US" dirty="0"/>
           </a:p>
@@ -2831,7 +2837,7 @@
           <a:p>
             <a:fld id="{4509A250-FF31-4206-8172-F9D3106AACB1}" type="datetimeFigureOut">
               <a:rPr lang="en-US" dirty="0"/>
-              <a:t>10/24/2018</a:t>
+              <a:t>10/31/2018</a:t>
             </a:fld>
             <a:endParaRPr lang="en-US" dirty="0"/>
           </a:p>
@@ -2996,7 +3002,7 @@
           <a:p>
             <a:fld id="{4509A250-FF31-4206-8172-F9D3106AACB1}" type="datetimeFigureOut">
               <a:rPr lang="en-US" dirty="0"/>
-              <a:t>10/24/2018</a:t>
+              <a:t>10/31/2018</a:t>
             </a:fld>
             <a:endParaRPr lang="en-US" dirty="0"/>
           </a:p>
@@ -3171,7 +3177,7 @@
           <a:p>
             <a:fld id="{4509A250-FF31-4206-8172-F9D3106AACB1}" type="datetimeFigureOut">
               <a:rPr lang="en-US" dirty="0"/>
-              <a:t>10/24/2018</a:t>
+              <a:t>10/31/2018</a:t>
             </a:fld>
             <a:endParaRPr lang="en-US" dirty="0"/>
           </a:p>
@@ -3336,7 +3342,7 @@
           <a:p>
             <a:fld id="{4509A250-FF31-4206-8172-F9D3106AACB1}" type="datetimeFigureOut">
               <a:rPr lang="en-US" dirty="0"/>
-              <a:t>10/24/2018</a:t>
+              <a:t>10/31/2018</a:t>
             </a:fld>
             <a:endParaRPr lang="en-US" dirty="0"/>
           </a:p>
@@ -3578,7 +3584,7 @@
           <a:p>
             <a:fld id="{9796027F-7875-4030-9381-8BD8C4F21935}" type="datetimeFigureOut">
               <a:rPr lang="en-US" dirty="0"/>
-              <a:t>10/24/2018</a:t>
+              <a:t>10/31/2018</a:t>
             </a:fld>
             <a:endParaRPr lang="en-US" dirty="0"/>
           </a:p>
@@ -3865,7 +3871,7 @@
           <a:p>
             <a:fld id="{9796027F-7875-4030-9381-8BD8C4F21935}" type="datetimeFigureOut">
               <a:rPr lang="en-US" dirty="0"/>
-              <a:t>10/24/2018</a:t>
+              <a:t>10/31/2018</a:t>
             </a:fld>
             <a:endParaRPr lang="en-US" dirty="0"/>
           </a:p>
@@ -4304,7 +4310,7 @@
           <a:p>
             <a:fld id="{9796027F-7875-4030-9381-8BD8C4F21935}" type="datetimeFigureOut">
               <a:rPr lang="en-US" dirty="0"/>
-              <a:t>10/24/2018</a:t>
+              <a:t>10/31/2018</a:t>
             </a:fld>
             <a:endParaRPr lang="en-US" dirty="0"/>
           </a:p>
@@ -4417,7 +4423,7 @@
           <a:p>
             <a:fld id="{4509A250-FF31-4206-8172-F9D3106AACB1}" type="datetimeFigureOut">
               <a:rPr lang="en-US" dirty="0"/>
-              <a:t>10/24/2018</a:t>
+              <a:t>10/31/2018</a:t>
             </a:fld>
             <a:endParaRPr lang="en-US" dirty="0"/>
           </a:p>
@@ -4507,7 +4513,7 @@
           <a:p>
             <a:fld id="{4509A250-FF31-4206-8172-F9D3106AACB1}" type="datetimeFigureOut">
               <a:rPr lang="en-US" dirty="0"/>
-              <a:t>10/24/2018</a:t>
+              <a:t>10/31/2018</a:t>
             </a:fld>
             <a:endParaRPr lang="en-US" dirty="0"/>
           </a:p>
@@ -4781,7 +4787,7 @@
           <a:p>
             <a:fld id="{4509A250-FF31-4206-8172-F9D3106AACB1}" type="datetimeFigureOut">
               <a:rPr lang="en-US" dirty="0"/>
-              <a:t>10/24/2018</a:t>
+              <a:t>10/31/2018</a:t>
             </a:fld>
             <a:endParaRPr lang="en-US" dirty="0"/>
           </a:p>
@@ -5051,7 +5057,7 @@
           <a:p>
             <a:fld id="{4509A250-FF31-4206-8172-F9D3106AACB1}" type="datetimeFigureOut">
               <a:rPr lang="en-US" dirty="0"/>
-              <a:t>10/24/2018</a:t>
+              <a:t>10/31/2018</a:t>
             </a:fld>
             <a:endParaRPr lang="en-US" dirty="0"/>
           </a:p>
@@ -5475,7 +5481,7 @@
           <a:p>
             <a:fld id="{4AAD347D-5ACD-4C99-B74B-A9C85AD731AF}" type="datetimeFigureOut">
               <a:rPr lang="en-US" dirty="0"/>
-              <a:t>10/24/2018</a:t>
+              <a:t>10/31/2018</a:t>
             </a:fld>
             <a:endParaRPr lang="en-US" dirty="0"/>
           </a:p>
@@ -6039,7 +6045,11 @@
           <a:p>
             <a:r>
               <a:rPr lang="en-AU" dirty="0" smtClean="0"/>
-              <a:t>Those numbers. Can you equal them</a:t>
+              <a:t>Those </a:t>
+            </a:r>
+            <a:r>
+              <a:rPr lang="en-AU" dirty="0" smtClean="0"/>
+              <a:t>numbers. Can you equal them</a:t>
             </a:r>
             <a:endParaRPr lang="en-AU" dirty="0"/>
           </a:p>
@@ -6123,8 +6133,9 @@
             </a:r>
             <a:r>
               <a:rPr lang="en-AU" dirty="0" smtClean="0"/>
-              <a:t>game</a:t>
-            </a:r>
+              <a:t>arithmetic game</a:t>
+            </a:r>
+            <a:endParaRPr lang="en-AU" dirty="0" smtClean="0"/>
           </a:p>
           <a:p>
             <a:r>
@@ -6141,14 +6152,20 @@
           <a:p>
             <a:r>
               <a:rPr lang="en-AU" dirty="0" smtClean="0"/>
-              <a:t>+- /*</a:t>
-            </a:r>
+              <a:t>Using any of the operations + -  / *</a:t>
+            </a:r>
+            <a:endParaRPr lang="en-AU" dirty="0" smtClean="0"/>
           </a:p>
           <a:p>
             <a:r>
               <a:rPr lang="en-AU" dirty="0" smtClean="0"/>
-              <a:t>You shoot with a metre that fills up depending how long you hold it</a:t>
-            </a:r>
+              <a:t>You shoot with a metre that fills up depending how long you hold </a:t>
+            </a:r>
+            <a:r>
+              <a:rPr lang="en-AU" dirty="0" smtClean="0"/>
+              <a:t>it which increases the value you can use operations on.</a:t>
+            </a:r>
+            <a:endParaRPr lang="en-AU" dirty="0" smtClean="0"/>
           </a:p>
           <a:p>
             <a:r>
@@ -6240,6 +6257,620 @@
           <a:lstStyle/>
           <a:p>
             <a:r>
+              <a:rPr lang="en-US" dirty="0" smtClean="0"/>
+              <a:t>Game</a:t>
+            </a:r>
+            <a:endParaRPr lang="en-AU" dirty="0"/>
+          </a:p>
+        </p:txBody>
+      </p:sp>
+      <p:sp>
+        <p:nvSpPr>
+          <p:cNvPr id="3" name="Content Placeholder 2"/>
+          <p:cNvSpPr>
+            <a:spLocks noGrp="1"/>
+          </p:cNvSpPr>
+          <p:nvPr>
+            <p:ph idx="1"/>
+          </p:nvPr>
+        </p:nvSpPr>
+        <p:spPr/>
+        <p:txBody>
+          <a:bodyPr/>
+          <a:lstStyle/>
+          <a:p>
+            <a:endParaRPr lang="en-AU" dirty="0"/>
+          </a:p>
+        </p:txBody>
+      </p:sp>
+      <p:sp>
+        <p:nvSpPr>
+          <p:cNvPr id="4" name="Rectangle 3"/>
+          <p:cNvSpPr/>
+          <p:nvPr/>
+        </p:nvSpPr>
+        <p:spPr>
+          <a:xfrm>
+            <a:off x="485192" y="1371600"/>
+            <a:ext cx="6120882" cy="4544008"/>
+          </a:xfrm>
+          <a:prstGeom prst="rect">
+            <a:avLst/>
+          </a:prstGeom>
+        </p:spPr>
+        <p:style>
+          <a:lnRef idx="2">
+            <a:schemeClr val="accent6">
+              <a:shade val="50000"/>
+            </a:schemeClr>
+          </a:lnRef>
+          <a:fillRef idx="1">
+            <a:schemeClr val="accent6"/>
+          </a:fillRef>
+          <a:effectRef idx="0">
+            <a:schemeClr val="accent6"/>
+          </a:effectRef>
+          <a:fontRef idx="minor">
+            <a:schemeClr val="lt1"/>
+          </a:fontRef>
+        </p:style>
+        <p:txBody>
+          <a:bodyPr rtlCol="0" anchor="ctr"/>
+          <a:lstStyle/>
+          <a:p>
+            <a:pPr algn="ctr"/>
+            <a:endParaRPr lang="en-AU"/>
+          </a:p>
+        </p:txBody>
+      </p:sp>
+      <p:sp>
+        <p:nvSpPr>
+          <p:cNvPr id="5" name="Oval 4"/>
+          <p:cNvSpPr/>
+          <p:nvPr/>
+        </p:nvSpPr>
+        <p:spPr>
+          <a:xfrm>
+            <a:off x="1856791" y="4758612"/>
+            <a:ext cx="326572" cy="335902"/>
+          </a:xfrm>
+          <a:prstGeom prst="ellipse">
+            <a:avLst/>
+          </a:prstGeom>
+        </p:spPr>
+        <p:style>
+          <a:lnRef idx="2">
+            <a:schemeClr val="dk1">
+              <a:shade val="50000"/>
+            </a:schemeClr>
+          </a:lnRef>
+          <a:fillRef idx="1">
+            <a:schemeClr val="dk1"/>
+          </a:fillRef>
+          <a:effectRef idx="0">
+            <a:schemeClr val="dk1"/>
+          </a:effectRef>
+          <a:fontRef idx="minor">
+            <a:schemeClr val="lt1"/>
+          </a:fontRef>
+        </p:style>
+        <p:txBody>
+          <a:bodyPr rtlCol="0" anchor="ctr"/>
+          <a:lstStyle/>
+          <a:p>
+            <a:pPr algn="ctr"/>
+            <a:endParaRPr lang="en-AU"/>
+          </a:p>
+        </p:txBody>
+      </p:sp>
+      <p:sp>
+        <p:nvSpPr>
+          <p:cNvPr id="6" name="Frame 5"/>
+          <p:cNvSpPr/>
+          <p:nvPr/>
+        </p:nvSpPr>
+        <p:spPr>
+          <a:xfrm>
+            <a:off x="485192" y="1371600"/>
+            <a:ext cx="6120882" cy="4544008"/>
+          </a:xfrm>
+          <a:prstGeom prst="frame">
+            <a:avLst/>
+          </a:prstGeom>
+        </p:spPr>
+        <p:style>
+          <a:lnRef idx="2">
+            <a:schemeClr val="accent2">
+              <a:shade val="50000"/>
+            </a:schemeClr>
+          </a:lnRef>
+          <a:fillRef idx="1">
+            <a:schemeClr val="accent2"/>
+          </a:fillRef>
+          <a:effectRef idx="0">
+            <a:schemeClr val="accent2"/>
+          </a:effectRef>
+          <a:fontRef idx="minor">
+            <a:schemeClr val="lt1"/>
+          </a:fontRef>
+        </p:style>
+        <p:txBody>
+          <a:bodyPr rtlCol="0" anchor="ctr"/>
+          <a:lstStyle/>
+          <a:p>
+            <a:pPr algn="ctr"/>
+            <a:endParaRPr lang="en-AU">
+              <a:solidFill>
+                <a:schemeClr val="tx1"/>
+              </a:solidFill>
+            </a:endParaRPr>
+          </a:p>
+        </p:txBody>
+      </p:sp>
+      <p:sp>
+        <p:nvSpPr>
+          <p:cNvPr id="7" name="Down Arrow 6"/>
+          <p:cNvSpPr/>
+          <p:nvPr/>
+        </p:nvSpPr>
+        <p:spPr>
+          <a:xfrm rot="2373934">
+            <a:off x="3359020" y="2631233"/>
+            <a:ext cx="457200" cy="1138334"/>
+          </a:xfrm>
+          <a:prstGeom prst="downArrow">
+            <a:avLst/>
+          </a:prstGeom>
+        </p:spPr>
+        <p:style>
+          <a:lnRef idx="2">
+            <a:schemeClr val="accent5">
+              <a:shade val="50000"/>
+            </a:schemeClr>
+          </a:lnRef>
+          <a:fillRef idx="1">
+            <a:schemeClr val="accent5"/>
+          </a:fillRef>
+          <a:effectRef idx="0">
+            <a:schemeClr val="accent5"/>
+          </a:effectRef>
+          <a:fontRef idx="minor">
+            <a:schemeClr val="lt1"/>
+          </a:fontRef>
+        </p:style>
+        <p:txBody>
+          <a:bodyPr rtlCol="0" anchor="ctr"/>
+          <a:lstStyle/>
+          <a:p>
+            <a:pPr algn="ctr"/>
+            <a:endParaRPr lang="en-AU"/>
+          </a:p>
+        </p:txBody>
+      </p:sp>
+      <p:sp>
+        <p:nvSpPr>
+          <p:cNvPr id="8" name="Oval 7"/>
+          <p:cNvSpPr/>
+          <p:nvPr/>
+        </p:nvSpPr>
+        <p:spPr>
+          <a:xfrm>
+            <a:off x="3963098" y="2286682"/>
+            <a:ext cx="326572" cy="335902"/>
+          </a:xfrm>
+          <a:prstGeom prst="ellipse">
+            <a:avLst/>
+          </a:prstGeom>
+        </p:spPr>
+        <p:style>
+          <a:lnRef idx="2">
+            <a:schemeClr val="accent1">
+              <a:shade val="50000"/>
+            </a:schemeClr>
+          </a:lnRef>
+          <a:fillRef idx="1">
+            <a:schemeClr val="accent1"/>
+          </a:fillRef>
+          <a:effectRef idx="0">
+            <a:schemeClr val="accent1"/>
+          </a:effectRef>
+          <a:fontRef idx="minor">
+            <a:schemeClr val="lt1"/>
+          </a:fontRef>
+        </p:style>
+        <p:txBody>
+          <a:bodyPr rtlCol="0" anchor="ctr"/>
+          <a:lstStyle/>
+          <a:p>
+            <a:pPr algn="ctr"/>
+            <a:endParaRPr lang="en-AU"/>
+          </a:p>
+        </p:txBody>
+      </p:sp>
+      <p:sp>
+        <p:nvSpPr>
+          <p:cNvPr id="9" name="TextBox 8"/>
+          <p:cNvSpPr txBox="1"/>
+          <p:nvPr/>
+        </p:nvSpPr>
+        <p:spPr>
+          <a:xfrm>
+            <a:off x="2397967" y="4665306"/>
+            <a:ext cx="1352939" cy="369332"/>
+          </a:xfrm>
+          <a:prstGeom prst="rect">
+            <a:avLst/>
+          </a:prstGeom>
+          <a:noFill/>
+        </p:spPr>
+        <p:txBody>
+          <a:bodyPr wrap="square" rtlCol="0">
+            <a:spAutoFit/>
+          </a:bodyPr>
+          <a:lstStyle/>
+          <a:p>
+            <a:r>
+              <a:rPr lang="en-US" dirty="0" smtClean="0"/>
+              <a:t>Player</a:t>
+            </a:r>
+            <a:endParaRPr lang="en-AU" dirty="0"/>
+          </a:p>
+        </p:txBody>
+      </p:sp>
+      <p:sp>
+        <p:nvSpPr>
+          <p:cNvPr id="10" name="TextBox 9"/>
+          <p:cNvSpPr txBox="1"/>
+          <p:nvPr/>
+        </p:nvSpPr>
+        <p:spPr>
+          <a:xfrm>
+            <a:off x="4495334" y="2253252"/>
+            <a:ext cx="1352939" cy="369332"/>
+          </a:xfrm>
+          <a:prstGeom prst="rect">
+            <a:avLst/>
+          </a:prstGeom>
+          <a:noFill/>
+        </p:spPr>
+        <p:txBody>
+          <a:bodyPr wrap="square" rtlCol="0">
+            <a:spAutoFit/>
+          </a:bodyPr>
+          <a:lstStyle/>
+          <a:p>
+            <a:r>
+              <a:rPr lang="en-US" dirty="0" smtClean="0"/>
+              <a:t>Enemy</a:t>
+            </a:r>
+            <a:endParaRPr lang="en-AU" dirty="0"/>
+          </a:p>
+        </p:txBody>
+      </p:sp>
+      <p:sp>
+        <p:nvSpPr>
+          <p:cNvPr id="11" name="TextBox 10"/>
+          <p:cNvSpPr txBox="1"/>
+          <p:nvPr/>
+        </p:nvSpPr>
+        <p:spPr>
+          <a:xfrm>
+            <a:off x="3858281" y="2984023"/>
+            <a:ext cx="1880045" cy="646331"/>
+          </a:xfrm>
+          <a:prstGeom prst="rect">
+            <a:avLst/>
+          </a:prstGeom>
+          <a:noFill/>
+        </p:spPr>
+        <p:txBody>
+          <a:bodyPr wrap="square" rtlCol="0">
+            <a:spAutoFit/>
+          </a:bodyPr>
+          <a:lstStyle/>
+          <a:p>
+            <a:r>
+              <a:rPr lang="en-US" dirty="0" smtClean="0"/>
+              <a:t>Follows player</a:t>
+            </a:r>
+          </a:p>
+          <a:p>
+            <a:endParaRPr lang="en-AU" dirty="0"/>
+          </a:p>
+        </p:txBody>
+      </p:sp>
+      <p:sp>
+        <p:nvSpPr>
+          <p:cNvPr id="12" name="Down Arrow 11"/>
+          <p:cNvSpPr/>
+          <p:nvPr/>
+        </p:nvSpPr>
+        <p:spPr>
+          <a:xfrm rot="13465725">
+            <a:off x="2564486" y="3725708"/>
+            <a:ext cx="127713" cy="527913"/>
+          </a:xfrm>
+          <a:prstGeom prst="downArrow">
+            <a:avLst/>
+          </a:prstGeom>
+        </p:spPr>
+        <p:style>
+          <a:lnRef idx="2">
+            <a:schemeClr val="accent1">
+              <a:shade val="50000"/>
+            </a:schemeClr>
+          </a:lnRef>
+          <a:fillRef idx="1">
+            <a:schemeClr val="accent1"/>
+          </a:fillRef>
+          <a:effectRef idx="0">
+            <a:schemeClr val="accent1"/>
+          </a:effectRef>
+          <a:fontRef idx="minor">
+            <a:schemeClr val="lt1"/>
+          </a:fontRef>
+        </p:style>
+        <p:txBody>
+          <a:bodyPr rtlCol="0" anchor="ctr"/>
+          <a:lstStyle/>
+          <a:p>
+            <a:pPr algn="ctr"/>
+            <a:endParaRPr lang="en-AU"/>
+          </a:p>
+        </p:txBody>
+      </p:sp>
+      <p:sp>
+        <p:nvSpPr>
+          <p:cNvPr id="13" name="Down Arrow 12"/>
+          <p:cNvSpPr/>
+          <p:nvPr/>
+        </p:nvSpPr>
+        <p:spPr>
+          <a:xfrm rot="13465725">
+            <a:off x="3004514" y="3383477"/>
+            <a:ext cx="125127" cy="681245"/>
+          </a:xfrm>
+          <a:prstGeom prst="downArrow">
+            <a:avLst/>
+          </a:prstGeom>
+        </p:spPr>
+        <p:style>
+          <a:lnRef idx="2">
+            <a:schemeClr val="accent1">
+              <a:shade val="50000"/>
+            </a:schemeClr>
+          </a:lnRef>
+          <a:fillRef idx="1">
+            <a:schemeClr val="accent1"/>
+          </a:fillRef>
+          <a:effectRef idx="0">
+            <a:schemeClr val="accent1"/>
+          </a:effectRef>
+          <a:fontRef idx="minor">
+            <a:schemeClr val="lt1"/>
+          </a:fontRef>
+        </p:style>
+        <p:txBody>
+          <a:bodyPr rtlCol="0" anchor="ctr"/>
+          <a:lstStyle/>
+          <a:p>
+            <a:pPr algn="ctr"/>
+            <a:endParaRPr lang="en-AU"/>
+          </a:p>
+        </p:txBody>
+      </p:sp>
+      <p:sp>
+        <p:nvSpPr>
+          <p:cNvPr id="14" name="Down Arrow 13"/>
+          <p:cNvSpPr/>
+          <p:nvPr/>
+        </p:nvSpPr>
+        <p:spPr>
+          <a:xfrm rot="13465725">
+            <a:off x="2801676" y="4053566"/>
+            <a:ext cx="139031" cy="551739"/>
+          </a:xfrm>
+          <a:prstGeom prst="downArrow">
+            <a:avLst/>
+          </a:prstGeom>
+        </p:spPr>
+        <p:style>
+          <a:lnRef idx="2">
+            <a:schemeClr val="accent1">
+              <a:shade val="50000"/>
+            </a:schemeClr>
+          </a:lnRef>
+          <a:fillRef idx="1">
+            <a:schemeClr val="accent1"/>
+          </a:fillRef>
+          <a:effectRef idx="0">
+            <a:schemeClr val="accent1"/>
+          </a:effectRef>
+          <a:fontRef idx="minor">
+            <a:schemeClr val="lt1"/>
+          </a:fontRef>
+        </p:style>
+        <p:txBody>
+          <a:bodyPr rtlCol="0" anchor="ctr"/>
+          <a:lstStyle/>
+          <a:p>
+            <a:pPr algn="ctr"/>
+            <a:endParaRPr lang="en-AU"/>
+          </a:p>
+        </p:txBody>
+      </p:sp>
+      <p:sp>
+        <p:nvSpPr>
+          <p:cNvPr id="15" name="TextBox 14"/>
+          <p:cNvSpPr txBox="1"/>
+          <p:nvPr/>
+        </p:nvSpPr>
+        <p:spPr>
+          <a:xfrm>
+            <a:off x="1997260" y="4047697"/>
+            <a:ext cx="1352939" cy="369332"/>
+          </a:xfrm>
+          <a:prstGeom prst="rect">
+            <a:avLst/>
+          </a:prstGeom>
+          <a:noFill/>
+        </p:spPr>
+        <p:txBody>
+          <a:bodyPr wrap="square" rtlCol="0">
+            <a:spAutoFit/>
+          </a:bodyPr>
+          <a:lstStyle/>
+          <a:p>
+            <a:r>
+              <a:rPr lang="en-US" dirty="0" smtClean="0"/>
+              <a:t>*10</a:t>
+            </a:r>
+            <a:r>
+              <a:rPr lang="en-AU" dirty="0" smtClean="0"/>
+              <a:t> </a:t>
+            </a:r>
+          </a:p>
+        </p:txBody>
+      </p:sp>
+      <p:sp>
+        <p:nvSpPr>
+          <p:cNvPr id="16" name="TextBox 15"/>
+          <p:cNvSpPr txBox="1"/>
+          <p:nvPr/>
+        </p:nvSpPr>
+        <p:spPr>
+          <a:xfrm>
+            <a:off x="2501754" y="3901495"/>
+            <a:ext cx="1352939" cy="369332"/>
+          </a:xfrm>
+          <a:prstGeom prst="rect">
+            <a:avLst/>
+          </a:prstGeom>
+          <a:noFill/>
+        </p:spPr>
+        <p:txBody>
+          <a:bodyPr wrap="square" rtlCol="0">
+            <a:spAutoFit/>
+          </a:bodyPr>
+          <a:lstStyle/>
+          <a:p>
+            <a:r>
+              <a:rPr lang="en-US" dirty="0" smtClean="0"/>
+              <a:t>+5</a:t>
+            </a:r>
+            <a:endParaRPr lang="en-AU" dirty="0" smtClean="0"/>
+          </a:p>
+        </p:txBody>
+      </p:sp>
+      <p:sp>
+        <p:nvSpPr>
+          <p:cNvPr id="17" name="TextBox 16"/>
+          <p:cNvSpPr txBox="1"/>
+          <p:nvPr/>
+        </p:nvSpPr>
+        <p:spPr>
+          <a:xfrm>
+            <a:off x="2372386" y="4388042"/>
+            <a:ext cx="1352939" cy="369332"/>
+          </a:xfrm>
+          <a:prstGeom prst="rect">
+            <a:avLst/>
+          </a:prstGeom>
+          <a:noFill/>
+        </p:spPr>
+        <p:txBody>
+          <a:bodyPr wrap="square" rtlCol="0">
+            <a:spAutoFit/>
+          </a:bodyPr>
+          <a:lstStyle/>
+          <a:p>
+            <a:r>
+              <a:rPr lang="en-US" dirty="0" smtClean="0"/>
+              <a:t>-3</a:t>
+            </a:r>
+            <a:endParaRPr lang="en-AU" dirty="0" smtClean="0"/>
+          </a:p>
+        </p:txBody>
+      </p:sp>
+      <p:sp>
+        <p:nvSpPr>
+          <p:cNvPr id="18" name="TextBox 17"/>
+          <p:cNvSpPr txBox="1"/>
+          <p:nvPr/>
+        </p:nvSpPr>
+        <p:spPr>
+          <a:xfrm>
+            <a:off x="3963098" y="1945142"/>
+            <a:ext cx="1352939" cy="369332"/>
+          </a:xfrm>
+          <a:prstGeom prst="rect">
+            <a:avLst/>
+          </a:prstGeom>
+          <a:noFill/>
+        </p:spPr>
+        <p:txBody>
+          <a:bodyPr wrap="square" rtlCol="0">
+            <a:spAutoFit/>
+          </a:bodyPr>
+          <a:lstStyle/>
+          <a:p>
+            <a:r>
+              <a:rPr lang="en-US" dirty="0" smtClean="0"/>
+              <a:t>47</a:t>
+            </a:r>
+            <a:r>
+              <a:rPr lang="en-AU" dirty="0" smtClean="0"/>
+              <a:t> </a:t>
+            </a:r>
+          </a:p>
+        </p:txBody>
+      </p:sp>
+    </p:spTree>
+    <p:extLst>
+      <p:ext uri="{BB962C8B-B14F-4D97-AF65-F5344CB8AC3E}">
+        <p14:creationId xmlns:p14="http://schemas.microsoft.com/office/powerpoint/2010/main" val="4191492812"/>
+      </p:ext>
+    </p:extLst>
+  </p:cSld>
+  <p:clrMapOvr>
+    <a:masterClrMapping/>
+  </p:clrMapOvr>
+</p:sld>
+</file>
+
+<file path=ppt/slides/slide4.xml><?xml version="1.0" encoding="utf-8"?>
+<p:sld xmlns:a="http://schemas.openxmlformats.org/drawingml/2006/main" xmlns:r="http://schemas.openxmlformats.org/officeDocument/2006/relationships" xmlns:p="http://schemas.openxmlformats.org/presentationml/2006/main">
+  <p:cSld>
+    <p:spTree>
+      <p:nvGrpSpPr>
+        <p:cNvPr id="1" name=""/>
+        <p:cNvGrpSpPr/>
+        <p:nvPr/>
+      </p:nvGrpSpPr>
+      <p:grpSpPr>
+        <a:xfrm>
+          <a:off x="0" y="0"/>
+          <a:ext cx="0" cy="0"/>
+          <a:chOff x="0" y="0"/>
+          <a:chExt cx="0" cy="0"/>
+        </a:xfrm>
+      </p:grpSpPr>
+      <p:sp>
+        <p:nvSpPr>
+          <p:cNvPr id="2" name="Title 1"/>
+          <p:cNvSpPr>
+            <a:spLocks noGrp="1"/>
+          </p:cNvSpPr>
+          <p:nvPr>
+            <p:ph type="title"/>
+          </p:nvPr>
+        </p:nvSpPr>
+        <p:spPr/>
+        <p:txBody>
+          <a:bodyPr/>
+          <a:lstStyle/>
+          <a:p>
+            <a:r>
               <a:rPr lang="en-AU" dirty="0" smtClean="0"/>
               <a:t>HURDLES</a:t>
             </a:r>
@@ -6270,8 +6901,13 @@
           <a:p>
             <a:r>
               <a:rPr lang="en-AU" dirty="0" smtClean="0"/>
-              <a:t>Weapon switch- although its more of a rehash</a:t>
-            </a:r>
+              <a:t>Weapon </a:t>
+            </a:r>
+            <a:r>
+              <a:rPr lang="en-AU" dirty="0" smtClean="0"/>
+              <a:t>switch</a:t>
+            </a:r>
+            <a:endParaRPr lang="en-AU" dirty="0" smtClean="0"/>
           </a:p>
           <a:p>
             <a:r>

</xml_diff>

<commit_message>
Build and pres controls
</commit_message>
<xml_diff>
--- a/Shooting MATH presV1.pptx
+++ b/Shooting MATH presV1.pptx
@@ -9,6 +9,7 @@
     <p:sldId id="257" r:id="rId3"/>
     <p:sldId id="259" r:id="rId4"/>
     <p:sldId id="258" r:id="rId5"/>
+    <p:sldId id="260" r:id="rId6"/>
   </p:sldIdLst>
   <p:sldSz cx="12192000" cy="6858000"/>
   <p:notesSz cx="6858000" cy="9144000"/>
@@ -301,7 +302,7 @@
           <a:p>
             <a:fld id="{4AAD347D-5ACD-4C99-B74B-A9C85AD731AF}" type="datetimeFigureOut">
               <a:rPr lang="en-US" dirty="0"/>
-              <a:t>10/31/2018</a:t>
+              <a:t>11/7/2018</a:t>
             </a:fld>
             <a:endParaRPr lang="en-US" dirty="0"/>
           </a:p>
@@ -571,7 +572,7 @@
           <a:p>
             <a:fld id="{4509A250-FF31-4206-8172-F9D3106AACB1}" type="datetimeFigureOut">
               <a:rPr lang="en-US" dirty="0"/>
-              <a:t>10/31/2018</a:t>
+              <a:t>11/7/2018</a:t>
             </a:fld>
             <a:endParaRPr lang="en-US" dirty="0"/>
           </a:p>
@@ -760,7 +761,7 @@
           <a:p>
             <a:fld id="{4509A250-FF31-4206-8172-F9D3106AACB1}" type="datetimeFigureOut">
               <a:rPr lang="en-US" dirty="0"/>
-              <a:t>10/31/2018</a:t>
+              <a:t>11/7/2018</a:t>
             </a:fld>
             <a:endParaRPr lang="en-US" dirty="0"/>
           </a:p>
@@ -1028,7 +1029,7 @@
           <a:p>
             <a:fld id="{4509A250-FF31-4206-8172-F9D3106AACB1}" type="datetimeFigureOut">
               <a:rPr lang="en-US" dirty="0"/>
-              <a:t>10/31/2018</a:t>
+              <a:t>11/7/2018</a:t>
             </a:fld>
             <a:endParaRPr lang="en-US" dirty="0"/>
           </a:p>
@@ -1364,7 +1365,7 @@
           <a:p>
             <a:fld id="{4509A250-FF31-4206-8172-F9D3106AACB1}" type="datetimeFigureOut">
               <a:rPr lang="en-US" dirty="0"/>
-              <a:t>10/31/2018</a:t>
+              <a:t>11/7/2018</a:t>
             </a:fld>
             <a:endParaRPr lang="en-US" dirty="0"/>
           </a:p>
@@ -1982,7 +1983,7 @@
           <a:p>
             <a:fld id="{4509A250-FF31-4206-8172-F9D3106AACB1}" type="datetimeFigureOut">
               <a:rPr lang="en-US" dirty="0"/>
-              <a:t>10/31/2018</a:t>
+              <a:t>11/7/2018</a:t>
             </a:fld>
             <a:endParaRPr lang="en-US" dirty="0"/>
           </a:p>
@@ -2837,7 +2838,7 @@
           <a:p>
             <a:fld id="{4509A250-FF31-4206-8172-F9D3106AACB1}" type="datetimeFigureOut">
               <a:rPr lang="en-US" dirty="0"/>
-              <a:t>10/31/2018</a:t>
+              <a:t>11/7/2018</a:t>
             </a:fld>
             <a:endParaRPr lang="en-US" dirty="0"/>
           </a:p>
@@ -3002,7 +3003,7 @@
           <a:p>
             <a:fld id="{4509A250-FF31-4206-8172-F9D3106AACB1}" type="datetimeFigureOut">
               <a:rPr lang="en-US" dirty="0"/>
-              <a:t>10/31/2018</a:t>
+              <a:t>11/7/2018</a:t>
             </a:fld>
             <a:endParaRPr lang="en-US" dirty="0"/>
           </a:p>
@@ -3177,7 +3178,7 @@
           <a:p>
             <a:fld id="{4509A250-FF31-4206-8172-F9D3106AACB1}" type="datetimeFigureOut">
               <a:rPr lang="en-US" dirty="0"/>
-              <a:t>10/31/2018</a:t>
+              <a:t>11/7/2018</a:t>
             </a:fld>
             <a:endParaRPr lang="en-US" dirty="0"/>
           </a:p>
@@ -3342,7 +3343,7 @@
           <a:p>
             <a:fld id="{4509A250-FF31-4206-8172-F9D3106AACB1}" type="datetimeFigureOut">
               <a:rPr lang="en-US" dirty="0"/>
-              <a:t>10/31/2018</a:t>
+              <a:t>11/7/2018</a:t>
             </a:fld>
             <a:endParaRPr lang="en-US" dirty="0"/>
           </a:p>
@@ -3584,7 +3585,7 @@
           <a:p>
             <a:fld id="{9796027F-7875-4030-9381-8BD8C4F21935}" type="datetimeFigureOut">
               <a:rPr lang="en-US" dirty="0"/>
-              <a:t>10/31/2018</a:t>
+              <a:t>11/7/2018</a:t>
             </a:fld>
             <a:endParaRPr lang="en-US" dirty="0"/>
           </a:p>
@@ -3871,7 +3872,7 @@
           <a:p>
             <a:fld id="{9796027F-7875-4030-9381-8BD8C4F21935}" type="datetimeFigureOut">
               <a:rPr lang="en-US" dirty="0"/>
-              <a:t>10/31/2018</a:t>
+              <a:t>11/7/2018</a:t>
             </a:fld>
             <a:endParaRPr lang="en-US" dirty="0"/>
           </a:p>
@@ -4310,7 +4311,7 @@
           <a:p>
             <a:fld id="{9796027F-7875-4030-9381-8BD8C4F21935}" type="datetimeFigureOut">
               <a:rPr lang="en-US" dirty="0"/>
-              <a:t>10/31/2018</a:t>
+              <a:t>11/7/2018</a:t>
             </a:fld>
             <a:endParaRPr lang="en-US" dirty="0"/>
           </a:p>
@@ -4423,7 +4424,7 @@
           <a:p>
             <a:fld id="{4509A250-FF31-4206-8172-F9D3106AACB1}" type="datetimeFigureOut">
               <a:rPr lang="en-US" dirty="0"/>
-              <a:t>10/31/2018</a:t>
+              <a:t>11/7/2018</a:t>
             </a:fld>
             <a:endParaRPr lang="en-US" dirty="0"/>
           </a:p>
@@ -4513,7 +4514,7 @@
           <a:p>
             <a:fld id="{4509A250-FF31-4206-8172-F9D3106AACB1}" type="datetimeFigureOut">
               <a:rPr lang="en-US" dirty="0"/>
-              <a:t>10/31/2018</a:t>
+              <a:t>11/7/2018</a:t>
             </a:fld>
             <a:endParaRPr lang="en-US" dirty="0"/>
           </a:p>
@@ -4787,7 +4788,7 @@
           <a:p>
             <a:fld id="{4509A250-FF31-4206-8172-F9D3106AACB1}" type="datetimeFigureOut">
               <a:rPr lang="en-US" dirty="0"/>
-              <a:t>10/31/2018</a:t>
+              <a:t>11/7/2018</a:t>
             </a:fld>
             <a:endParaRPr lang="en-US" dirty="0"/>
           </a:p>
@@ -5057,7 +5058,7 @@
           <a:p>
             <a:fld id="{4509A250-FF31-4206-8172-F9D3106AACB1}" type="datetimeFigureOut">
               <a:rPr lang="en-US" dirty="0"/>
-              <a:t>10/31/2018</a:t>
+              <a:t>11/7/2018</a:t>
             </a:fld>
             <a:endParaRPr lang="en-US" dirty="0"/>
           </a:p>
@@ -5481,7 +5482,7 @@
           <a:p>
             <a:fld id="{4AAD347D-5ACD-4C99-B74B-A9C85AD731AF}" type="datetimeFigureOut">
               <a:rPr lang="en-US" dirty="0"/>
-              <a:t>10/31/2018</a:t>
+              <a:t>11/7/2018</a:t>
             </a:fld>
             <a:endParaRPr lang="en-US" dirty="0"/>
           </a:p>
@@ -6045,11 +6046,7 @@
           <a:p>
             <a:r>
               <a:rPr lang="en-AU" dirty="0" smtClean="0"/>
-              <a:t>Those </a:t>
-            </a:r>
-            <a:r>
-              <a:rPr lang="en-AU" dirty="0" smtClean="0"/>
-              <a:t>numbers. Can you equal them</a:t>
+              <a:t>Those numbers. Can you equal them</a:t>
             </a:r>
             <a:endParaRPr lang="en-AU" dirty="0"/>
           </a:p>
@@ -6135,7 +6132,6 @@
               <a:rPr lang="en-AU" dirty="0" smtClean="0"/>
               <a:t>arithmetic game</a:t>
             </a:r>
-            <a:endParaRPr lang="en-AU" dirty="0" smtClean="0"/>
           </a:p>
           <a:p>
             <a:r>
@@ -6154,18 +6150,12 @@
               <a:rPr lang="en-AU" dirty="0" smtClean="0"/>
               <a:t>Using any of the operations + -  / *</a:t>
             </a:r>
-            <a:endParaRPr lang="en-AU" dirty="0" smtClean="0"/>
           </a:p>
           <a:p>
             <a:r>
               <a:rPr lang="en-AU" dirty="0" smtClean="0"/>
-              <a:t>You shoot with a metre that fills up depending how long you hold </a:t>
-            </a:r>
-            <a:r>
-              <a:rPr lang="en-AU" dirty="0" smtClean="0"/>
-              <a:t>it which increases the value you can use operations on.</a:t>
-            </a:r>
-            <a:endParaRPr lang="en-AU" dirty="0" smtClean="0"/>
+              <a:t>You shoot with a metre that fills up depending how long you hold it which increases the value you can use operations on.</a:t>
+            </a:r>
           </a:p>
           <a:p>
             <a:r>
@@ -6901,13 +6891,8 @@
           <a:p>
             <a:r>
               <a:rPr lang="en-AU" dirty="0" smtClean="0"/>
-              <a:t>Weapon </a:t>
-            </a:r>
-            <a:r>
-              <a:rPr lang="en-AU" dirty="0" smtClean="0"/>
-              <a:t>switch</a:t>
-            </a:r>
-            <a:endParaRPr lang="en-AU" dirty="0" smtClean="0"/>
+              <a:t>Weapon switch</a:t>
+            </a:r>
           </a:p>
           <a:p>
             <a:r>
@@ -6921,6 +6906,195 @@
     <p:extLst>
       <p:ext uri="{BB962C8B-B14F-4D97-AF65-F5344CB8AC3E}">
         <p14:creationId xmlns:p14="http://schemas.microsoft.com/office/powerpoint/2010/main" val="2528964398"/>
+      </p:ext>
+    </p:extLst>
+  </p:cSld>
+  <p:clrMapOvr>
+    <a:masterClrMapping/>
+  </p:clrMapOvr>
+</p:sld>
+</file>
+
+<file path=ppt/slides/slide5.xml><?xml version="1.0" encoding="utf-8"?>
+<p:sld xmlns:a="http://schemas.openxmlformats.org/drawingml/2006/main" xmlns:r="http://schemas.openxmlformats.org/officeDocument/2006/relationships" xmlns:p="http://schemas.openxmlformats.org/presentationml/2006/main">
+  <p:cSld>
+    <p:spTree>
+      <p:nvGrpSpPr>
+        <p:cNvPr id="1" name=""/>
+        <p:cNvGrpSpPr/>
+        <p:nvPr/>
+      </p:nvGrpSpPr>
+      <p:grpSpPr>
+        <a:xfrm>
+          <a:off x="0" y="0"/>
+          <a:ext cx="0" cy="0"/>
+          <a:chOff x="0" y="0"/>
+          <a:chExt cx="0" cy="0"/>
+        </a:xfrm>
+      </p:grpSpPr>
+      <p:sp>
+        <p:nvSpPr>
+          <p:cNvPr id="2" name="Title 1"/>
+          <p:cNvSpPr>
+            <a:spLocks noGrp="1"/>
+          </p:cNvSpPr>
+          <p:nvPr>
+            <p:ph type="title"/>
+          </p:nvPr>
+        </p:nvSpPr>
+        <p:spPr/>
+        <p:txBody>
+          <a:bodyPr/>
+          <a:lstStyle/>
+          <a:p>
+            <a:r>
+              <a:rPr lang="en-AU" dirty="0" smtClean="0"/>
+              <a:t>Controls		</a:t>
+            </a:r>
+            <a:endParaRPr lang="en-AU" dirty="0"/>
+          </a:p>
+        </p:txBody>
+      </p:sp>
+      <p:sp>
+        <p:nvSpPr>
+          <p:cNvPr id="3" name="Content Placeholder 2"/>
+          <p:cNvSpPr>
+            <a:spLocks noGrp="1"/>
+          </p:cNvSpPr>
+          <p:nvPr>
+            <p:ph idx="1"/>
+          </p:nvPr>
+        </p:nvSpPr>
+        <p:spPr/>
+        <p:txBody>
+          <a:bodyPr/>
+          <a:lstStyle/>
+          <a:p>
+            <a:r>
+              <a:rPr lang="en-AU" dirty="0" smtClean="0"/>
+              <a:t>Left mouse button fire</a:t>
+            </a:r>
+          </a:p>
+          <a:p>
+            <a:r>
+              <a:rPr lang="en-AU" dirty="0" smtClean="0"/>
+              <a:t>Left mouse button hold to gain number value from meter</a:t>
+            </a:r>
+          </a:p>
+          <a:p>
+            <a:r>
+              <a:rPr lang="en-AU" dirty="0" smtClean="0"/>
+              <a:t>Right mouse button change operation</a:t>
+            </a:r>
+          </a:p>
+          <a:p>
+            <a:r>
+              <a:rPr lang="en-AU" dirty="0" smtClean="0"/>
+              <a:t>WSAD movement.</a:t>
+            </a:r>
+          </a:p>
+          <a:p>
+            <a:r>
+              <a:rPr lang="en-AU" dirty="0" smtClean="0"/>
+              <a:t>Avoid enemy, it will 1 </a:t>
+            </a:r>
+            <a:r>
+              <a:rPr lang="en-AU" smtClean="0"/>
+              <a:t>hit kill you.</a:t>
+            </a:r>
+            <a:endParaRPr lang="en-AU" dirty="0" smtClean="0"/>
+          </a:p>
+          <a:p>
+            <a:r>
+              <a:rPr lang="en-AU" dirty="0" smtClean="0"/>
+              <a:t>Use operations to equal number of enemy before time runs out</a:t>
+            </a:r>
+            <a:endParaRPr lang="en-AU" dirty="0"/>
+          </a:p>
+        </p:txBody>
+      </p:sp>
+      <p:sp>
+        <p:nvSpPr>
+          <p:cNvPr id="4" name="AutoShape 2" descr="Image result for right button click"/>
+          <p:cNvSpPr>
+            <a:spLocks noChangeAspect="1" noChangeArrowheads="1"/>
+          </p:cNvSpPr>
+          <p:nvPr/>
+        </p:nvSpPr>
+        <p:spPr bwMode="auto">
+          <a:xfrm>
+            <a:off x="155575" y="-144463"/>
+            <a:ext cx="304800" cy="304801"/>
+          </a:xfrm>
+          <a:prstGeom prst="rect">
+            <a:avLst/>
+          </a:prstGeom>
+          <a:noFill/>
+          <a:extLst>
+            <a:ext uri="{909E8E84-426E-40DD-AFC4-6F175D3DCCD1}">
+              <a14:hiddenFill xmlns:a14="http://schemas.microsoft.com/office/drawing/2010/main">
+                <a:solidFill>
+                  <a:srgbClr val="FFFFFF"/>
+                </a:solidFill>
+              </a14:hiddenFill>
+            </a:ext>
+          </a:extLst>
+        </p:spPr>
+        <p:txBody>
+          <a:bodyPr vert="horz" wrap="square" lIns="91440" tIns="45720" rIns="91440" bIns="45720" numCol="1" anchor="t" anchorCtr="0" compatLnSpc="1">
+            <a:prstTxWarp prst="textNoShape">
+              <a:avLst/>
+            </a:prstTxWarp>
+          </a:bodyPr>
+          <a:lstStyle/>
+          <a:p>
+            <a:endParaRPr lang="en-AU"/>
+          </a:p>
+        </p:txBody>
+      </p:sp>
+      <p:sp>
+        <p:nvSpPr>
+          <p:cNvPr id="6" name="AutoShape 6" descr="Image result for right button click"/>
+          <p:cNvSpPr>
+            <a:spLocks noChangeAspect="1" noChangeArrowheads="1"/>
+          </p:cNvSpPr>
+          <p:nvPr/>
+        </p:nvSpPr>
+        <p:spPr bwMode="auto">
+          <a:xfrm>
+            <a:off x="307974" y="7937"/>
+            <a:ext cx="5042501" cy="5042518"/>
+          </a:xfrm>
+          <a:prstGeom prst="rect">
+            <a:avLst/>
+          </a:prstGeom>
+          <a:noFill/>
+          <a:extLst>
+            <a:ext uri="{909E8E84-426E-40DD-AFC4-6F175D3DCCD1}">
+              <a14:hiddenFill xmlns:a14="http://schemas.microsoft.com/office/drawing/2010/main">
+                <a:solidFill>
+                  <a:srgbClr val="FFFFFF"/>
+                </a:solidFill>
+              </a14:hiddenFill>
+            </a:ext>
+          </a:extLst>
+        </p:spPr>
+        <p:txBody>
+          <a:bodyPr vert="horz" wrap="square" lIns="91440" tIns="45720" rIns="91440" bIns="45720" numCol="1" anchor="t" anchorCtr="0" compatLnSpc="1">
+            <a:prstTxWarp prst="textNoShape">
+              <a:avLst/>
+            </a:prstTxWarp>
+          </a:bodyPr>
+          <a:lstStyle/>
+          <a:p>
+            <a:endParaRPr lang="en-AU"/>
+          </a:p>
+        </p:txBody>
+      </p:sp>
+    </p:spTree>
+    <p:extLst>
+      <p:ext uri="{BB962C8B-B14F-4D97-AF65-F5344CB8AC3E}">
+        <p14:creationId xmlns:p14="http://schemas.microsoft.com/office/powerpoint/2010/main" val="1603398127"/>
       </p:ext>
     </p:extLst>
   </p:cSld>

</xml_diff>